<commit_message>
with bus after full test
</commit_message>
<xml_diff>
--- a/报告图.pptx
+++ b/报告图.pptx
@@ -8,6 +8,7 @@
     <p:sldId id="256" r:id="rId2"/>
     <p:sldId id="257" r:id="rId3"/>
     <p:sldId id="258" r:id="rId4"/>
+    <p:sldId id="259" r:id="rId5"/>
   </p:sldIdLst>
   <p:sldSz cx="12192000" cy="6858000"/>
   <p:notesSz cx="6858000" cy="9144000"/>
@@ -106,6 +107,11 @@
       </a:defRPr>
     </a:lvl9pPr>
   </p:defaultTextStyle>
+  <p:extLst>
+    <p:ext uri="{EFAFB233-063F-42B5-8137-9DF3F51BA10A}">
+      <p15:sldGuideLst xmlns:p15="http://schemas.microsoft.com/office/powerpoint/2012/main"/>
+    </p:ext>
+  </p:extLst>
 </p:presentation>
 </file>
 
@@ -268,7 +274,7 @@
           <a:p>
             <a:fld id="{BC616131-9C1E-4363-9CC6-0EF05B0C033C}" type="datetimeFigureOut">
               <a:rPr lang="zh-CN" altLang="en-US" smtClean="0"/>
-              <a:t>2022/11/4</a:t>
+              <a:t>2022/11/6</a:t>
             </a:fld>
             <a:endParaRPr lang="zh-CN" altLang="en-US"/>
           </a:p>
@@ -466,7 +472,7 @@
           <a:p>
             <a:fld id="{BC616131-9C1E-4363-9CC6-0EF05B0C033C}" type="datetimeFigureOut">
               <a:rPr lang="zh-CN" altLang="en-US" smtClean="0"/>
-              <a:t>2022/11/4</a:t>
+              <a:t>2022/11/6</a:t>
             </a:fld>
             <a:endParaRPr lang="zh-CN" altLang="en-US"/>
           </a:p>
@@ -674,7 +680,7 @@
           <a:p>
             <a:fld id="{BC616131-9C1E-4363-9CC6-0EF05B0C033C}" type="datetimeFigureOut">
               <a:rPr lang="zh-CN" altLang="en-US" smtClean="0"/>
-              <a:t>2022/11/4</a:t>
+              <a:t>2022/11/6</a:t>
             </a:fld>
             <a:endParaRPr lang="zh-CN" altLang="en-US"/>
           </a:p>
@@ -872,7 +878,7 @@
           <a:p>
             <a:fld id="{BC616131-9C1E-4363-9CC6-0EF05B0C033C}" type="datetimeFigureOut">
               <a:rPr lang="zh-CN" altLang="en-US" smtClean="0"/>
-              <a:t>2022/11/4</a:t>
+              <a:t>2022/11/6</a:t>
             </a:fld>
             <a:endParaRPr lang="zh-CN" altLang="en-US"/>
           </a:p>
@@ -1147,7 +1153,7 @@
           <a:p>
             <a:fld id="{BC616131-9C1E-4363-9CC6-0EF05B0C033C}" type="datetimeFigureOut">
               <a:rPr lang="zh-CN" altLang="en-US" smtClean="0"/>
-              <a:t>2022/11/4</a:t>
+              <a:t>2022/11/6</a:t>
             </a:fld>
             <a:endParaRPr lang="zh-CN" altLang="en-US"/>
           </a:p>
@@ -1412,7 +1418,7 @@
           <a:p>
             <a:fld id="{BC616131-9C1E-4363-9CC6-0EF05B0C033C}" type="datetimeFigureOut">
               <a:rPr lang="zh-CN" altLang="en-US" smtClean="0"/>
-              <a:t>2022/11/4</a:t>
+              <a:t>2022/11/6</a:t>
             </a:fld>
             <a:endParaRPr lang="zh-CN" altLang="en-US"/>
           </a:p>
@@ -1824,7 +1830,7 @@
           <a:p>
             <a:fld id="{BC616131-9C1E-4363-9CC6-0EF05B0C033C}" type="datetimeFigureOut">
               <a:rPr lang="zh-CN" altLang="en-US" smtClean="0"/>
-              <a:t>2022/11/4</a:t>
+              <a:t>2022/11/6</a:t>
             </a:fld>
             <a:endParaRPr lang="zh-CN" altLang="en-US"/>
           </a:p>
@@ -1965,7 +1971,7 @@
           <a:p>
             <a:fld id="{BC616131-9C1E-4363-9CC6-0EF05B0C033C}" type="datetimeFigureOut">
               <a:rPr lang="zh-CN" altLang="en-US" smtClean="0"/>
-              <a:t>2022/11/4</a:t>
+              <a:t>2022/11/6</a:t>
             </a:fld>
             <a:endParaRPr lang="zh-CN" altLang="en-US"/>
           </a:p>
@@ -2078,7 +2084,7 @@
           <a:p>
             <a:fld id="{BC616131-9C1E-4363-9CC6-0EF05B0C033C}" type="datetimeFigureOut">
               <a:rPr lang="zh-CN" altLang="en-US" smtClean="0"/>
-              <a:t>2022/11/4</a:t>
+              <a:t>2022/11/6</a:t>
             </a:fld>
             <a:endParaRPr lang="zh-CN" altLang="en-US"/>
           </a:p>
@@ -2389,7 +2395,7 @@
           <a:p>
             <a:fld id="{BC616131-9C1E-4363-9CC6-0EF05B0C033C}" type="datetimeFigureOut">
               <a:rPr lang="zh-CN" altLang="en-US" smtClean="0"/>
-              <a:t>2022/11/4</a:t>
+              <a:t>2022/11/6</a:t>
             </a:fld>
             <a:endParaRPr lang="zh-CN" altLang="en-US"/>
           </a:p>
@@ -2677,7 +2683,7 @@
           <a:p>
             <a:fld id="{BC616131-9C1E-4363-9CC6-0EF05B0C033C}" type="datetimeFigureOut">
               <a:rPr lang="zh-CN" altLang="en-US" smtClean="0"/>
-              <a:t>2022/11/4</a:t>
+              <a:t>2022/11/6</a:t>
             </a:fld>
             <a:endParaRPr lang="zh-CN" altLang="en-US"/>
           </a:p>
@@ -2918,7 +2924,7 @@
           <a:p>
             <a:fld id="{BC616131-9C1E-4363-9CC6-0EF05B0C033C}" type="datetimeFigureOut">
               <a:rPr lang="zh-CN" altLang="en-US" smtClean="0"/>
-              <a:t>2022/11/4</a:t>
+              <a:t>2022/11/6</a:t>
             </a:fld>
             <a:endParaRPr lang="zh-CN" altLang="en-US"/>
           </a:p>
@@ -5195,6 +5201,1362 @@
 </p:sld>
 </file>
 
+<file path=ppt/slides/slide4.xml><?xml version="1.0" encoding="utf-8"?>
+<p:sld xmlns:a="http://schemas.openxmlformats.org/drawingml/2006/main" xmlns:r="http://schemas.openxmlformats.org/officeDocument/2006/relationships" xmlns:p="http://schemas.openxmlformats.org/presentationml/2006/main">
+  <p:cSld>
+    <p:spTree>
+      <p:nvGrpSpPr>
+        <p:cNvPr id="1" name=""/>
+        <p:cNvGrpSpPr/>
+        <p:nvPr/>
+      </p:nvGrpSpPr>
+      <p:grpSpPr>
+        <a:xfrm>
+          <a:off x="0" y="0"/>
+          <a:ext cx="0" cy="0"/>
+          <a:chOff x="0" y="0"/>
+          <a:chExt cx="0" cy="0"/>
+        </a:xfrm>
+      </p:grpSpPr>
+      <p:grpSp>
+        <p:nvGrpSpPr>
+          <p:cNvPr id="41" name="组合 40">
+            <a:extLst>
+              <a:ext uri="{FF2B5EF4-FFF2-40B4-BE49-F238E27FC236}">
+                <a16:creationId xmlns:a16="http://schemas.microsoft.com/office/drawing/2014/main" id="{0F14D4AB-1139-4A18-BC90-C7DE951D3349}"/>
+              </a:ext>
+            </a:extLst>
+          </p:cNvPr>
+          <p:cNvGrpSpPr/>
+          <p:nvPr/>
+        </p:nvGrpSpPr>
+        <p:grpSpPr>
+          <a:xfrm>
+            <a:off x="133684" y="0"/>
+            <a:ext cx="11924632" cy="6858000"/>
+            <a:chOff x="133684" y="0"/>
+            <a:chExt cx="11924632" cy="6858000"/>
+          </a:xfrm>
+        </p:grpSpPr>
+        <p:pic>
+          <p:nvPicPr>
+            <p:cNvPr id="7" name="图片 6">
+              <a:extLst>
+                <a:ext uri="{FF2B5EF4-FFF2-40B4-BE49-F238E27FC236}">
+                  <a16:creationId xmlns:a16="http://schemas.microsoft.com/office/drawing/2014/main" id="{44BC89C3-B3AF-4622-A0E4-33B0ECAF9E03}"/>
+                </a:ext>
+              </a:extLst>
+            </p:cNvPr>
+            <p:cNvPicPr>
+              <a:picLocks noChangeAspect="1"/>
+            </p:cNvPicPr>
+            <p:nvPr/>
+          </p:nvPicPr>
+          <p:blipFill>
+            <a:blip r:embed="rId2">
+              <a:extLst>
+                <a:ext uri="{28A0092B-C50C-407E-A947-70E740481C1C}">
+                  <a14:useLocalDpi xmlns:a14="http://schemas.microsoft.com/office/drawing/2010/main" val="0"/>
+                </a:ext>
+              </a:extLst>
+            </a:blip>
+            <a:stretch>
+              <a:fillRect/>
+            </a:stretch>
+          </p:blipFill>
+          <p:spPr>
+            <a:xfrm>
+              <a:off x="133684" y="0"/>
+              <a:ext cx="11924632" cy="6858000"/>
+            </a:xfrm>
+            <a:prstGeom prst="rect">
+              <a:avLst/>
+            </a:prstGeom>
+          </p:spPr>
+        </p:pic>
+        <p:sp>
+          <p:nvSpPr>
+            <p:cNvPr id="8" name="矩形 7">
+              <a:extLst>
+                <a:ext uri="{FF2B5EF4-FFF2-40B4-BE49-F238E27FC236}">
+                  <a16:creationId xmlns:a16="http://schemas.microsoft.com/office/drawing/2014/main" id="{3D47DC6D-90B9-4CDA-AA06-AC8A9E811099}"/>
+                </a:ext>
+              </a:extLst>
+            </p:cNvPr>
+            <p:cNvSpPr/>
+            <p:nvPr/>
+          </p:nvSpPr>
+          <p:spPr>
+            <a:xfrm>
+              <a:off x="5207793" y="3228976"/>
+              <a:ext cx="102393" cy="130967"/>
+            </a:xfrm>
+            <a:prstGeom prst="rect">
+              <a:avLst/>
+            </a:prstGeom>
+            <a:solidFill>
+              <a:schemeClr val="bg1"/>
+            </a:solidFill>
+            <a:ln>
+              <a:noFill/>
+            </a:ln>
+          </p:spPr>
+          <p:style>
+            <a:lnRef idx="2">
+              <a:schemeClr val="accent1">
+                <a:shade val="50000"/>
+              </a:schemeClr>
+            </a:lnRef>
+            <a:fillRef idx="1">
+              <a:schemeClr val="accent1"/>
+            </a:fillRef>
+            <a:effectRef idx="0">
+              <a:schemeClr val="accent1"/>
+            </a:effectRef>
+            <a:fontRef idx="minor">
+              <a:schemeClr val="lt1"/>
+            </a:fontRef>
+          </p:style>
+          <p:txBody>
+            <a:bodyPr rtlCol="0" anchor="ctr"/>
+            <a:lstStyle/>
+            <a:p>
+              <a:pPr algn="ctr"/>
+              <a:r>
+                <a:rPr lang="zh-CN" altLang="en-US" sz="800" dirty="0">
+                  <a:solidFill>
+                    <a:schemeClr val="tx1"/>
+                  </a:solidFill>
+                </a:rPr>
+                <a:t>是</a:t>
+              </a:r>
+            </a:p>
+          </p:txBody>
+        </p:sp>
+        <p:sp>
+          <p:nvSpPr>
+            <p:cNvPr id="9" name="矩形 8">
+              <a:extLst>
+                <a:ext uri="{FF2B5EF4-FFF2-40B4-BE49-F238E27FC236}">
+                  <a16:creationId xmlns:a16="http://schemas.microsoft.com/office/drawing/2014/main" id="{A07FD836-92BD-4DCB-A1E8-C6A7B6C7489C}"/>
+                </a:ext>
+              </a:extLst>
+            </p:cNvPr>
+            <p:cNvSpPr/>
+            <p:nvPr/>
+          </p:nvSpPr>
+          <p:spPr>
+            <a:xfrm>
+              <a:off x="5046662" y="1577975"/>
+              <a:ext cx="102393" cy="130967"/>
+            </a:xfrm>
+            <a:prstGeom prst="rect">
+              <a:avLst/>
+            </a:prstGeom>
+            <a:solidFill>
+              <a:schemeClr val="bg1"/>
+            </a:solidFill>
+            <a:ln>
+              <a:noFill/>
+            </a:ln>
+          </p:spPr>
+          <p:style>
+            <a:lnRef idx="2">
+              <a:schemeClr val="accent1">
+                <a:shade val="50000"/>
+              </a:schemeClr>
+            </a:lnRef>
+            <a:fillRef idx="1">
+              <a:schemeClr val="accent1"/>
+            </a:fillRef>
+            <a:effectRef idx="0">
+              <a:schemeClr val="accent1"/>
+            </a:effectRef>
+            <a:fontRef idx="minor">
+              <a:schemeClr val="lt1"/>
+            </a:fontRef>
+          </p:style>
+          <p:txBody>
+            <a:bodyPr rtlCol="0" anchor="ctr"/>
+            <a:lstStyle/>
+            <a:p>
+              <a:pPr algn="ctr"/>
+              <a:r>
+                <a:rPr lang="zh-CN" altLang="en-US" sz="800" dirty="0">
+                  <a:solidFill>
+                    <a:schemeClr val="tx1"/>
+                  </a:solidFill>
+                </a:rPr>
+                <a:t>是</a:t>
+              </a:r>
+            </a:p>
+          </p:txBody>
+        </p:sp>
+        <p:sp>
+          <p:nvSpPr>
+            <p:cNvPr id="18" name="矩形 17">
+              <a:extLst>
+                <a:ext uri="{FF2B5EF4-FFF2-40B4-BE49-F238E27FC236}">
+                  <a16:creationId xmlns:a16="http://schemas.microsoft.com/office/drawing/2014/main" id="{CD04C3C5-B3D7-451E-8612-DDA27FF4AB68}"/>
+                </a:ext>
+              </a:extLst>
+            </p:cNvPr>
+            <p:cNvSpPr/>
+            <p:nvPr/>
+          </p:nvSpPr>
+          <p:spPr>
+            <a:xfrm>
+              <a:off x="3155949" y="920751"/>
+              <a:ext cx="102393" cy="130967"/>
+            </a:xfrm>
+            <a:prstGeom prst="rect">
+              <a:avLst/>
+            </a:prstGeom>
+            <a:solidFill>
+              <a:schemeClr val="bg1"/>
+            </a:solidFill>
+            <a:ln>
+              <a:noFill/>
+            </a:ln>
+          </p:spPr>
+          <p:style>
+            <a:lnRef idx="2">
+              <a:schemeClr val="accent1">
+                <a:shade val="50000"/>
+              </a:schemeClr>
+            </a:lnRef>
+            <a:fillRef idx="1">
+              <a:schemeClr val="accent1"/>
+            </a:fillRef>
+            <a:effectRef idx="0">
+              <a:schemeClr val="accent1"/>
+            </a:effectRef>
+            <a:fontRef idx="minor">
+              <a:schemeClr val="lt1"/>
+            </a:fontRef>
+          </p:style>
+          <p:txBody>
+            <a:bodyPr rtlCol="0" anchor="ctr"/>
+            <a:lstStyle/>
+            <a:p>
+              <a:pPr algn="ctr"/>
+              <a:r>
+                <a:rPr lang="zh-CN" altLang="en-US" sz="800" dirty="0">
+                  <a:solidFill>
+                    <a:schemeClr val="tx1"/>
+                  </a:solidFill>
+                </a:rPr>
+                <a:t>是</a:t>
+              </a:r>
+            </a:p>
+          </p:txBody>
+        </p:sp>
+        <p:sp>
+          <p:nvSpPr>
+            <p:cNvPr id="19" name="矩形 18">
+              <a:extLst>
+                <a:ext uri="{FF2B5EF4-FFF2-40B4-BE49-F238E27FC236}">
+                  <a16:creationId xmlns:a16="http://schemas.microsoft.com/office/drawing/2014/main" id="{51E3B838-61D0-4C5C-8F94-D2BBE75D2EC5}"/>
+                </a:ext>
+              </a:extLst>
+            </p:cNvPr>
+            <p:cNvSpPr/>
+            <p:nvPr/>
+          </p:nvSpPr>
+          <p:spPr>
+            <a:xfrm>
+              <a:off x="1993899" y="920751"/>
+              <a:ext cx="102393" cy="130967"/>
+            </a:xfrm>
+            <a:prstGeom prst="rect">
+              <a:avLst/>
+            </a:prstGeom>
+            <a:solidFill>
+              <a:schemeClr val="bg1"/>
+            </a:solidFill>
+            <a:ln>
+              <a:noFill/>
+            </a:ln>
+          </p:spPr>
+          <p:style>
+            <a:lnRef idx="2">
+              <a:schemeClr val="accent1">
+                <a:shade val="50000"/>
+              </a:schemeClr>
+            </a:lnRef>
+            <a:fillRef idx="1">
+              <a:schemeClr val="accent1"/>
+            </a:fillRef>
+            <a:effectRef idx="0">
+              <a:schemeClr val="accent1"/>
+            </a:effectRef>
+            <a:fontRef idx="minor">
+              <a:schemeClr val="lt1"/>
+            </a:fontRef>
+          </p:style>
+          <p:txBody>
+            <a:bodyPr rtlCol="0" anchor="ctr"/>
+            <a:lstStyle/>
+            <a:p>
+              <a:pPr algn="ctr"/>
+              <a:r>
+                <a:rPr lang="zh-CN" altLang="en-US" sz="800" dirty="0">
+                  <a:solidFill>
+                    <a:schemeClr val="tx1"/>
+                  </a:solidFill>
+                </a:rPr>
+                <a:t>是</a:t>
+              </a:r>
+            </a:p>
+          </p:txBody>
+        </p:sp>
+        <p:sp>
+          <p:nvSpPr>
+            <p:cNvPr id="20" name="矩形 19">
+              <a:extLst>
+                <a:ext uri="{FF2B5EF4-FFF2-40B4-BE49-F238E27FC236}">
+                  <a16:creationId xmlns:a16="http://schemas.microsoft.com/office/drawing/2014/main" id="{AD71B7D0-6F6D-481A-8EF6-C619AB257BB7}"/>
+                </a:ext>
+              </a:extLst>
+            </p:cNvPr>
+            <p:cNvSpPr/>
+            <p:nvPr/>
+          </p:nvSpPr>
+          <p:spPr>
+            <a:xfrm>
+              <a:off x="2482055" y="2592388"/>
+              <a:ext cx="102393" cy="130967"/>
+            </a:xfrm>
+            <a:prstGeom prst="rect">
+              <a:avLst/>
+            </a:prstGeom>
+            <a:solidFill>
+              <a:schemeClr val="bg1"/>
+            </a:solidFill>
+            <a:ln>
+              <a:noFill/>
+            </a:ln>
+          </p:spPr>
+          <p:style>
+            <a:lnRef idx="2">
+              <a:schemeClr val="accent1">
+                <a:shade val="50000"/>
+              </a:schemeClr>
+            </a:lnRef>
+            <a:fillRef idx="1">
+              <a:schemeClr val="accent1"/>
+            </a:fillRef>
+            <a:effectRef idx="0">
+              <a:schemeClr val="accent1"/>
+            </a:effectRef>
+            <a:fontRef idx="minor">
+              <a:schemeClr val="lt1"/>
+            </a:fontRef>
+          </p:style>
+          <p:txBody>
+            <a:bodyPr rtlCol="0" anchor="ctr"/>
+            <a:lstStyle/>
+            <a:p>
+              <a:pPr algn="ctr"/>
+              <a:r>
+                <a:rPr lang="zh-CN" altLang="en-US" sz="800" dirty="0">
+                  <a:solidFill>
+                    <a:schemeClr val="tx1"/>
+                  </a:solidFill>
+                </a:rPr>
+                <a:t>是</a:t>
+              </a:r>
+            </a:p>
+          </p:txBody>
+        </p:sp>
+        <p:sp>
+          <p:nvSpPr>
+            <p:cNvPr id="21" name="矩形 20">
+              <a:extLst>
+                <a:ext uri="{FF2B5EF4-FFF2-40B4-BE49-F238E27FC236}">
+                  <a16:creationId xmlns:a16="http://schemas.microsoft.com/office/drawing/2014/main" id="{0E24879B-E254-473E-AACB-99CC88288E65}"/>
+                </a:ext>
+              </a:extLst>
+            </p:cNvPr>
+            <p:cNvSpPr/>
+            <p:nvPr/>
+          </p:nvSpPr>
+          <p:spPr>
+            <a:xfrm>
+              <a:off x="2646362" y="4340226"/>
+              <a:ext cx="102393" cy="130967"/>
+            </a:xfrm>
+            <a:prstGeom prst="rect">
+              <a:avLst/>
+            </a:prstGeom>
+            <a:solidFill>
+              <a:schemeClr val="bg1"/>
+            </a:solidFill>
+            <a:ln>
+              <a:noFill/>
+            </a:ln>
+          </p:spPr>
+          <p:style>
+            <a:lnRef idx="2">
+              <a:schemeClr val="accent1">
+                <a:shade val="50000"/>
+              </a:schemeClr>
+            </a:lnRef>
+            <a:fillRef idx="1">
+              <a:schemeClr val="accent1"/>
+            </a:fillRef>
+            <a:effectRef idx="0">
+              <a:schemeClr val="accent1"/>
+            </a:effectRef>
+            <a:fontRef idx="minor">
+              <a:schemeClr val="lt1"/>
+            </a:fontRef>
+          </p:style>
+          <p:txBody>
+            <a:bodyPr rtlCol="0" anchor="ctr"/>
+            <a:lstStyle/>
+            <a:p>
+              <a:pPr algn="ctr"/>
+              <a:r>
+                <a:rPr lang="zh-CN" altLang="en-US" sz="800" dirty="0">
+                  <a:solidFill>
+                    <a:schemeClr val="tx1"/>
+                  </a:solidFill>
+                </a:rPr>
+                <a:t>是</a:t>
+              </a:r>
+            </a:p>
+          </p:txBody>
+        </p:sp>
+        <p:sp>
+          <p:nvSpPr>
+            <p:cNvPr id="22" name="矩形 21">
+              <a:extLst>
+                <a:ext uri="{FF2B5EF4-FFF2-40B4-BE49-F238E27FC236}">
+                  <a16:creationId xmlns:a16="http://schemas.microsoft.com/office/drawing/2014/main" id="{E223B896-8027-48E4-B718-1A195A90E4D4}"/>
+                </a:ext>
+              </a:extLst>
+            </p:cNvPr>
+            <p:cNvSpPr/>
+            <p:nvPr/>
+          </p:nvSpPr>
+          <p:spPr>
+            <a:xfrm>
+              <a:off x="9425781" y="3690939"/>
+              <a:ext cx="102393" cy="130967"/>
+            </a:xfrm>
+            <a:prstGeom prst="rect">
+              <a:avLst/>
+            </a:prstGeom>
+            <a:solidFill>
+              <a:schemeClr val="bg1"/>
+            </a:solidFill>
+            <a:ln>
+              <a:noFill/>
+            </a:ln>
+          </p:spPr>
+          <p:style>
+            <a:lnRef idx="2">
+              <a:schemeClr val="accent1">
+                <a:shade val="50000"/>
+              </a:schemeClr>
+            </a:lnRef>
+            <a:fillRef idx="1">
+              <a:schemeClr val="accent1"/>
+            </a:fillRef>
+            <a:effectRef idx="0">
+              <a:schemeClr val="accent1"/>
+            </a:effectRef>
+            <a:fontRef idx="minor">
+              <a:schemeClr val="lt1"/>
+            </a:fontRef>
+          </p:style>
+          <p:txBody>
+            <a:bodyPr rtlCol="0" anchor="ctr"/>
+            <a:lstStyle/>
+            <a:p>
+              <a:pPr algn="ctr"/>
+              <a:r>
+                <a:rPr lang="zh-CN" altLang="en-US" sz="800" dirty="0">
+                  <a:solidFill>
+                    <a:schemeClr val="tx1"/>
+                  </a:solidFill>
+                </a:rPr>
+                <a:t>是</a:t>
+              </a:r>
+            </a:p>
+          </p:txBody>
+        </p:sp>
+        <p:sp>
+          <p:nvSpPr>
+            <p:cNvPr id="23" name="矩形 22">
+              <a:extLst>
+                <a:ext uri="{FF2B5EF4-FFF2-40B4-BE49-F238E27FC236}">
+                  <a16:creationId xmlns:a16="http://schemas.microsoft.com/office/drawing/2014/main" id="{85D4739A-13E8-4F47-8679-812430EDC222}"/>
+                </a:ext>
+              </a:extLst>
+            </p:cNvPr>
+            <p:cNvSpPr/>
+            <p:nvPr/>
+          </p:nvSpPr>
+          <p:spPr>
+            <a:xfrm>
+              <a:off x="9259093" y="4699001"/>
+              <a:ext cx="102393" cy="130967"/>
+            </a:xfrm>
+            <a:prstGeom prst="rect">
+              <a:avLst/>
+            </a:prstGeom>
+            <a:solidFill>
+              <a:schemeClr val="bg1"/>
+            </a:solidFill>
+            <a:ln>
+              <a:noFill/>
+            </a:ln>
+          </p:spPr>
+          <p:style>
+            <a:lnRef idx="2">
+              <a:schemeClr val="accent1">
+                <a:shade val="50000"/>
+              </a:schemeClr>
+            </a:lnRef>
+            <a:fillRef idx="1">
+              <a:schemeClr val="accent1"/>
+            </a:fillRef>
+            <a:effectRef idx="0">
+              <a:schemeClr val="accent1"/>
+            </a:effectRef>
+            <a:fontRef idx="minor">
+              <a:schemeClr val="lt1"/>
+            </a:fontRef>
+          </p:style>
+          <p:txBody>
+            <a:bodyPr rtlCol="0" anchor="ctr"/>
+            <a:lstStyle/>
+            <a:p>
+              <a:pPr algn="ctr"/>
+              <a:r>
+                <a:rPr lang="zh-CN" altLang="en-US" sz="800" dirty="0">
+                  <a:solidFill>
+                    <a:schemeClr val="tx1"/>
+                  </a:solidFill>
+                </a:rPr>
+                <a:t>是</a:t>
+              </a:r>
+            </a:p>
+          </p:txBody>
+        </p:sp>
+        <p:sp>
+          <p:nvSpPr>
+            <p:cNvPr id="24" name="矩形 23">
+              <a:extLst>
+                <a:ext uri="{FF2B5EF4-FFF2-40B4-BE49-F238E27FC236}">
+                  <a16:creationId xmlns:a16="http://schemas.microsoft.com/office/drawing/2014/main" id="{CB3477A6-0D41-400A-9E34-B1627B78F917}"/>
+                </a:ext>
+              </a:extLst>
+            </p:cNvPr>
+            <p:cNvSpPr/>
+            <p:nvPr/>
+          </p:nvSpPr>
+          <p:spPr>
+            <a:xfrm>
+              <a:off x="9172573" y="1010841"/>
+              <a:ext cx="102393" cy="130967"/>
+            </a:xfrm>
+            <a:prstGeom prst="rect">
+              <a:avLst/>
+            </a:prstGeom>
+            <a:solidFill>
+              <a:schemeClr val="bg1"/>
+            </a:solidFill>
+            <a:ln>
+              <a:noFill/>
+            </a:ln>
+          </p:spPr>
+          <p:style>
+            <a:lnRef idx="2">
+              <a:schemeClr val="accent1">
+                <a:shade val="50000"/>
+              </a:schemeClr>
+            </a:lnRef>
+            <a:fillRef idx="1">
+              <a:schemeClr val="accent1"/>
+            </a:fillRef>
+            <a:effectRef idx="0">
+              <a:schemeClr val="accent1"/>
+            </a:effectRef>
+            <a:fontRef idx="minor">
+              <a:schemeClr val="lt1"/>
+            </a:fontRef>
+          </p:style>
+          <p:txBody>
+            <a:bodyPr rtlCol="0" anchor="ctr"/>
+            <a:lstStyle/>
+            <a:p>
+              <a:pPr algn="ctr"/>
+              <a:r>
+                <a:rPr lang="zh-CN" altLang="en-US" sz="800" dirty="0">
+                  <a:solidFill>
+                    <a:schemeClr val="tx1"/>
+                  </a:solidFill>
+                </a:rPr>
+                <a:t>是</a:t>
+              </a:r>
+            </a:p>
+          </p:txBody>
+        </p:sp>
+        <p:sp>
+          <p:nvSpPr>
+            <p:cNvPr id="25" name="矩形 24">
+              <a:extLst>
+                <a:ext uri="{FF2B5EF4-FFF2-40B4-BE49-F238E27FC236}">
+                  <a16:creationId xmlns:a16="http://schemas.microsoft.com/office/drawing/2014/main" id="{A6E608AF-BA48-4FB7-B8C6-31812296D53A}"/>
+                </a:ext>
+              </a:extLst>
+            </p:cNvPr>
+            <p:cNvSpPr/>
+            <p:nvPr/>
+          </p:nvSpPr>
+          <p:spPr>
+            <a:xfrm>
+              <a:off x="10839448" y="1003300"/>
+              <a:ext cx="102393" cy="130967"/>
+            </a:xfrm>
+            <a:prstGeom prst="rect">
+              <a:avLst/>
+            </a:prstGeom>
+            <a:solidFill>
+              <a:schemeClr val="bg1"/>
+            </a:solidFill>
+            <a:ln>
+              <a:noFill/>
+            </a:ln>
+          </p:spPr>
+          <p:style>
+            <a:lnRef idx="2">
+              <a:schemeClr val="accent1">
+                <a:shade val="50000"/>
+              </a:schemeClr>
+            </a:lnRef>
+            <a:fillRef idx="1">
+              <a:schemeClr val="accent1"/>
+            </a:fillRef>
+            <a:effectRef idx="0">
+              <a:schemeClr val="accent1"/>
+            </a:effectRef>
+            <a:fontRef idx="minor">
+              <a:schemeClr val="lt1"/>
+            </a:fontRef>
+          </p:style>
+          <p:txBody>
+            <a:bodyPr rtlCol="0" anchor="ctr"/>
+            <a:lstStyle/>
+            <a:p>
+              <a:pPr algn="ctr"/>
+              <a:r>
+                <a:rPr lang="zh-CN" altLang="en-US" sz="800" dirty="0">
+                  <a:solidFill>
+                    <a:schemeClr val="tx1"/>
+                  </a:solidFill>
+                </a:rPr>
+                <a:t>是</a:t>
+              </a:r>
+            </a:p>
+          </p:txBody>
+        </p:sp>
+        <p:grpSp>
+          <p:nvGrpSpPr>
+            <p:cNvPr id="28" name="组合 27">
+              <a:extLst>
+                <a:ext uri="{FF2B5EF4-FFF2-40B4-BE49-F238E27FC236}">
+                  <a16:creationId xmlns:a16="http://schemas.microsoft.com/office/drawing/2014/main" id="{076F6986-11DD-4598-9C91-5CCC6E50815D}"/>
+                </a:ext>
+              </a:extLst>
+            </p:cNvPr>
+            <p:cNvGrpSpPr/>
+            <p:nvPr/>
+          </p:nvGrpSpPr>
+          <p:grpSpPr>
+            <a:xfrm>
+              <a:off x="1409699" y="1889126"/>
+              <a:ext cx="736601" cy="199703"/>
+              <a:chOff x="1409699" y="1889126"/>
+              <a:chExt cx="736601" cy="199703"/>
+            </a:xfrm>
+          </p:grpSpPr>
+          <p:sp>
+            <p:nvSpPr>
+              <p:cNvPr id="26" name="矩形 25">
+                <a:extLst>
+                  <a:ext uri="{FF2B5EF4-FFF2-40B4-BE49-F238E27FC236}">
+                    <a16:creationId xmlns:a16="http://schemas.microsoft.com/office/drawing/2014/main" id="{3076765A-B71D-43DF-8897-7CD0A8627A26}"/>
+                  </a:ext>
+                </a:extLst>
+              </p:cNvPr>
+              <p:cNvSpPr/>
+              <p:nvPr/>
+            </p:nvSpPr>
+            <p:spPr>
+              <a:xfrm>
+                <a:off x="1409699" y="1889126"/>
+                <a:ext cx="736601" cy="166686"/>
+              </a:xfrm>
+              <a:prstGeom prst="rect">
+                <a:avLst/>
+              </a:prstGeom>
+              <a:solidFill>
+                <a:schemeClr val="bg1"/>
+              </a:solidFill>
+              <a:ln>
+                <a:noFill/>
+              </a:ln>
+            </p:spPr>
+            <p:style>
+              <a:lnRef idx="2">
+                <a:schemeClr val="accent1">
+                  <a:shade val="50000"/>
+                </a:schemeClr>
+              </a:lnRef>
+              <a:fillRef idx="1">
+                <a:schemeClr val="accent1"/>
+              </a:fillRef>
+              <a:effectRef idx="0">
+                <a:schemeClr val="accent1"/>
+              </a:effectRef>
+              <a:fontRef idx="minor">
+                <a:schemeClr val="lt1"/>
+              </a:fontRef>
+            </p:style>
+            <p:txBody>
+              <a:bodyPr rtlCol="0" anchor="ctr"/>
+              <a:lstStyle/>
+              <a:p>
+                <a:pPr algn="ctr"/>
+                <a:r>
+                  <a:rPr lang="zh-CN" altLang="en-US" sz="800" dirty="0">
+                    <a:solidFill>
+                      <a:schemeClr val="tx1"/>
+                    </a:solidFill>
+                  </a:rPr>
+                  <a:t>否，为</a:t>
+                </a:r>
+                <a:r>
+                  <a:rPr lang="en-US" altLang="zh-CN" sz="800" dirty="0">
+                    <a:solidFill>
+                      <a:schemeClr val="tx1"/>
+                    </a:solidFill>
+                  </a:rPr>
+                  <a:t>E</a:t>
+                </a:r>
+                <a:r>
+                  <a:rPr lang="zh-CN" altLang="en-US" sz="800" dirty="0">
+                    <a:solidFill>
+                      <a:schemeClr val="tx1"/>
+                    </a:solidFill>
+                  </a:rPr>
+                  <a:t>或</a:t>
+                </a:r>
+                <a:r>
+                  <a:rPr lang="en-US" altLang="zh-CN" sz="800" dirty="0">
+                    <a:solidFill>
+                      <a:schemeClr val="tx1"/>
+                    </a:solidFill>
+                  </a:rPr>
+                  <a:t>M</a:t>
+                </a:r>
+                <a:endParaRPr lang="zh-CN" altLang="en-US" sz="800" dirty="0">
+                  <a:solidFill>
+                    <a:schemeClr val="tx1"/>
+                  </a:solidFill>
+                </a:endParaRPr>
+              </a:p>
+            </p:txBody>
+          </p:sp>
+          <p:sp>
+            <p:nvSpPr>
+              <p:cNvPr id="27" name="矩形 26">
+                <a:extLst>
+                  <a:ext uri="{FF2B5EF4-FFF2-40B4-BE49-F238E27FC236}">
+                    <a16:creationId xmlns:a16="http://schemas.microsoft.com/office/drawing/2014/main" id="{04CBE960-4E5D-463A-8D22-267261BFB51C}"/>
+                  </a:ext>
+                </a:extLst>
+              </p:cNvPr>
+              <p:cNvSpPr/>
+              <p:nvPr/>
+            </p:nvSpPr>
+            <p:spPr>
+              <a:xfrm flipV="1">
+                <a:off x="1473200" y="2043110"/>
+                <a:ext cx="520699" cy="45719"/>
+              </a:xfrm>
+              <a:prstGeom prst="rect">
+                <a:avLst/>
+              </a:prstGeom>
+              <a:solidFill>
+                <a:schemeClr val="bg1"/>
+              </a:solidFill>
+              <a:ln>
+                <a:noFill/>
+              </a:ln>
+            </p:spPr>
+            <p:style>
+              <a:lnRef idx="2">
+                <a:schemeClr val="accent1">
+                  <a:shade val="50000"/>
+                </a:schemeClr>
+              </a:lnRef>
+              <a:fillRef idx="1">
+                <a:schemeClr val="accent1"/>
+              </a:fillRef>
+              <a:effectRef idx="0">
+                <a:schemeClr val="accent1"/>
+              </a:effectRef>
+              <a:fontRef idx="minor">
+                <a:schemeClr val="lt1"/>
+              </a:fontRef>
+            </p:style>
+            <p:txBody>
+              <a:bodyPr rtlCol="0" anchor="ctr"/>
+              <a:lstStyle/>
+              <a:p>
+                <a:pPr algn="ctr"/>
+                <a:endParaRPr lang="zh-CN" altLang="en-US" sz="800" dirty="0">
+                  <a:solidFill>
+                    <a:schemeClr val="tx1"/>
+                  </a:solidFill>
+                </a:endParaRPr>
+              </a:p>
+            </p:txBody>
+          </p:sp>
+        </p:grpSp>
+        <p:sp>
+          <p:nvSpPr>
+            <p:cNvPr id="30" name="矩形 29">
+              <a:extLst>
+                <a:ext uri="{FF2B5EF4-FFF2-40B4-BE49-F238E27FC236}">
+                  <a16:creationId xmlns:a16="http://schemas.microsoft.com/office/drawing/2014/main" id="{642A4720-96AB-47B9-8292-88B2A9241BEE}"/>
+                </a:ext>
+              </a:extLst>
+            </p:cNvPr>
+            <p:cNvSpPr/>
+            <p:nvPr/>
+          </p:nvSpPr>
+          <p:spPr>
+            <a:xfrm>
+              <a:off x="9693732" y="1539951"/>
+              <a:ext cx="736601" cy="130966"/>
+            </a:xfrm>
+            <a:prstGeom prst="rect">
+              <a:avLst/>
+            </a:prstGeom>
+            <a:solidFill>
+              <a:schemeClr val="bg1"/>
+            </a:solidFill>
+            <a:ln>
+              <a:noFill/>
+            </a:ln>
+          </p:spPr>
+          <p:style>
+            <a:lnRef idx="2">
+              <a:schemeClr val="accent1">
+                <a:shade val="50000"/>
+              </a:schemeClr>
+            </a:lnRef>
+            <a:fillRef idx="1">
+              <a:schemeClr val="accent1"/>
+            </a:fillRef>
+            <a:effectRef idx="0">
+              <a:schemeClr val="accent1"/>
+            </a:effectRef>
+            <a:fontRef idx="minor">
+              <a:schemeClr val="lt1"/>
+            </a:fontRef>
+          </p:style>
+          <p:txBody>
+            <a:bodyPr rtlCol="0" anchor="ctr"/>
+            <a:lstStyle/>
+            <a:p>
+              <a:pPr algn="ctr"/>
+              <a:r>
+                <a:rPr lang="zh-CN" altLang="en-US" sz="800" dirty="0">
+                  <a:solidFill>
+                    <a:schemeClr val="tx1"/>
+                  </a:solidFill>
+                </a:rPr>
+                <a:t>否，为</a:t>
+              </a:r>
+              <a:r>
+                <a:rPr lang="en-US" altLang="zh-CN" sz="800" dirty="0">
+                  <a:solidFill>
+                    <a:schemeClr val="tx1"/>
+                  </a:solidFill>
+                </a:rPr>
+                <a:t>E</a:t>
+              </a:r>
+              <a:r>
+                <a:rPr lang="zh-CN" altLang="en-US" sz="800" dirty="0">
+                  <a:solidFill>
+                    <a:schemeClr val="tx1"/>
+                  </a:solidFill>
+                </a:rPr>
+                <a:t>或</a:t>
+              </a:r>
+              <a:r>
+                <a:rPr lang="en-US" altLang="zh-CN" sz="800" dirty="0">
+                  <a:solidFill>
+                    <a:schemeClr val="tx1"/>
+                  </a:solidFill>
+                </a:rPr>
+                <a:t>M</a:t>
+              </a:r>
+              <a:endParaRPr lang="zh-CN" altLang="en-US" sz="800" dirty="0">
+                <a:solidFill>
+                  <a:schemeClr val="tx1"/>
+                </a:solidFill>
+              </a:endParaRPr>
+            </a:p>
+          </p:txBody>
+        </p:sp>
+        <p:sp>
+          <p:nvSpPr>
+            <p:cNvPr id="32" name="矩形 31">
+              <a:extLst>
+                <a:ext uri="{FF2B5EF4-FFF2-40B4-BE49-F238E27FC236}">
+                  <a16:creationId xmlns:a16="http://schemas.microsoft.com/office/drawing/2014/main" id="{341DA1CD-D5E0-4FE5-9AD8-E51D93872881}"/>
+                </a:ext>
+              </a:extLst>
+            </p:cNvPr>
+            <p:cNvSpPr/>
+            <p:nvPr/>
+          </p:nvSpPr>
+          <p:spPr>
+            <a:xfrm>
+              <a:off x="2486816" y="1467324"/>
+              <a:ext cx="102393" cy="130967"/>
+            </a:xfrm>
+            <a:prstGeom prst="rect">
+              <a:avLst/>
+            </a:prstGeom>
+            <a:solidFill>
+              <a:schemeClr val="bg1"/>
+            </a:solidFill>
+            <a:ln>
+              <a:noFill/>
+            </a:ln>
+          </p:spPr>
+          <p:style>
+            <a:lnRef idx="2">
+              <a:schemeClr val="accent1">
+                <a:shade val="50000"/>
+              </a:schemeClr>
+            </a:lnRef>
+            <a:fillRef idx="1">
+              <a:schemeClr val="accent1"/>
+            </a:fillRef>
+            <a:effectRef idx="0">
+              <a:schemeClr val="accent1"/>
+            </a:effectRef>
+            <a:fontRef idx="minor">
+              <a:schemeClr val="lt1"/>
+            </a:fontRef>
+          </p:style>
+          <p:txBody>
+            <a:bodyPr rtlCol="0" anchor="ctr"/>
+            <a:lstStyle/>
+            <a:p>
+              <a:pPr algn="ctr"/>
+              <a:r>
+                <a:rPr lang="zh-CN" altLang="en-US" sz="800" dirty="0">
+                  <a:solidFill>
+                    <a:schemeClr val="tx1"/>
+                  </a:solidFill>
+                </a:rPr>
+                <a:t>否</a:t>
+              </a:r>
+            </a:p>
+          </p:txBody>
+        </p:sp>
+        <p:sp>
+          <p:nvSpPr>
+            <p:cNvPr id="33" name="矩形 32">
+              <a:extLst>
+                <a:ext uri="{FF2B5EF4-FFF2-40B4-BE49-F238E27FC236}">
+                  <a16:creationId xmlns:a16="http://schemas.microsoft.com/office/drawing/2014/main" id="{077C677D-5E46-4CB8-90B2-DDA91C1A2E50}"/>
+                </a:ext>
+              </a:extLst>
+            </p:cNvPr>
+            <p:cNvSpPr/>
+            <p:nvPr/>
+          </p:nvSpPr>
+          <p:spPr>
+            <a:xfrm>
+              <a:off x="4372767" y="964880"/>
+              <a:ext cx="102393" cy="130967"/>
+            </a:xfrm>
+            <a:prstGeom prst="rect">
+              <a:avLst/>
+            </a:prstGeom>
+            <a:solidFill>
+              <a:schemeClr val="bg1"/>
+            </a:solidFill>
+            <a:ln>
+              <a:noFill/>
+            </a:ln>
+          </p:spPr>
+          <p:style>
+            <a:lnRef idx="2">
+              <a:schemeClr val="accent1">
+                <a:shade val="50000"/>
+              </a:schemeClr>
+            </a:lnRef>
+            <a:fillRef idx="1">
+              <a:schemeClr val="accent1"/>
+            </a:fillRef>
+            <a:effectRef idx="0">
+              <a:schemeClr val="accent1"/>
+            </a:effectRef>
+            <a:fontRef idx="minor">
+              <a:schemeClr val="lt1"/>
+            </a:fontRef>
+          </p:style>
+          <p:txBody>
+            <a:bodyPr rtlCol="0" anchor="ctr"/>
+            <a:lstStyle/>
+            <a:p>
+              <a:pPr algn="ctr"/>
+              <a:r>
+                <a:rPr lang="zh-CN" altLang="en-US" sz="800" dirty="0">
+                  <a:solidFill>
+                    <a:schemeClr val="tx1"/>
+                  </a:solidFill>
+                </a:rPr>
+                <a:t>否</a:t>
+              </a:r>
+            </a:p>
+          </p:txBody>
+        </p:sp>
+        <p:sp>
+          <p:nvSpPr>
+            <p:cNvPr id="34" name="矩形 33">
+              <a:extLst>
+                <a:ext uri="{FF2B5EF4-FFF2-40B4-BE49-F238E27FC236}">
+                  <a16:creationId xmlns:a16="http://schemas.microsoft.com/office/drawing/2014/main" id="{D3DBE632-41E7-4949-9C21-DE5992A23624}"/>
+                </a:ext>
+              </a:extLst>
+            </p:cNvPr>
+            <p:cNvSpPr/>
+            <p:nvPr/>
+          </p:nvSpPr>
+          <p:spPr>
+            <a:xfrm>
+              <a:off x="5876131" y="981472"/>
+              <a:ext cx="102393" cy="130967"/>
+            </a:xfrm>
+            <a:prstGeom prst="rect">
+              <a:avLst/>
+            </a:prstGeom>
+            <a:solidFill>
+              <a:schemeClr val="bg1"/>
+            </a:solidFill>
+            <a:ln>
+              <a:noFill/>
+            </a:ln>
+          </p:spPr>
+          <p:style>
+            <a:lnRef idx="2">
+              <a:schemeClr val="accent1">
+                <a:shade val="50000"/>
+              </a:schemeClr>
+            </a:lnRef>
+            <a:fillRef idx="1">
+              <a:schemeClr val="accent1"/>
+            </a:fillRef>
+            <a:effectRef idx="0">
+              <a:schemeClr val="accent1"/>
+            </a:effectRef>
+            <a:fontRef idx="minor">
+              <a:schemeClr val="lt1"/>
+            </a:fontRef>
+          </p:style>
+          <p:txBody>
+            <a:bodyPr rtlCol="0" anchor="ctr"/>
+            <a:lstStyle/>
+            <a:p>
+              <a:pPr algn="ctr"/>
+              <a:r>
+                <a:rPr lang="zh-CN" altLang="en-US" sz="800" dirty="0">
+                  <a:solidFill>
+                    <a:schemeClr val="tx1"/>
+                  </a:solidFill>
+                </a:rPr>
+                <a:t>否</a:t>
+              </a:r>
+            </a:p>
+          </p:txBody>
+        </p:sp>
+        <p:sp>
+          <p:nvSpPr>
+            <p:cNvPr id="35" name="矩形 34">
+              <a:extLst>
+                <a:ext uri="{FF2B5EF4-FFF2-40B4-BE49-F238E27FC236}">
+                  <a16:creationId xmlns:a16="http://schemas.microsoft.com/office/drawing/2014/main" id="{B622B159-78A6-421D-8798-53B6D1E48197}"/>
+                </a:ext>
+              </a:extLst>
+            </p:cNvPr>
+            <p:cNvSpPr/>
+            <p:nvPr/>
+          </p:nvSpPr>
+          <p:spPr>
+            <a:xfrm>
+              <a:off x="1895869" y="3810793"/>
+              <a:ext cx="102393" cy="130967"/>
+            </a:xfrm>
+            <a:prstGeom prst="rect">
+              <a:avLst/>
+            </a:prstGeom>
+            <a:solidFill>
+              <a:schemeClr val="bg1"/>
+            </a:solidFill>
+            <a:ln>
+              <a:noFill/>
+            </a:ln>
+          </p:spPr>
+          <p:style>
+            <a:lnRef idx="2">
+              <a:schemeClr val="accent1">
+                <a:shade val="50000"/>
+              </a:schemeClr>
+            </a:lnRef>
+            <a:fillRef idx="1">
+              <a:schemeClr val="accent1"/>
+            </a:fillRef>
+            <a:effectRef idx="0">
+              <a:schemeClr val="accent1"/>
+            </a:effectRef>
+            <a:fontRef idx="minor">
+              <a:schemeClr val="lt1"/>
+            </a:fontRef>
+          </p:style>
+          <p:txBody>
+            <a:bodyPr rtlCol="0" anchor="ctr"/>
+            <a:lstStyle/>
+            <a:p>
+              <a:pPr algn="ctr"/>
+              <a:r>
+                <a:rPr lang="zh-CN" altLang="en-US" sz="800" dirty="0">
+                  <a:solidFill>
+                    <a:schemeClr val="tx1"/>
+                  </a:solidFill>
+                </a:rPr>
+                <a:t>否</a:t>
+              </a:r>
+            </a:p>
+          </p:txBody>
+        </p:sp>
+        <p:sp>
+          <p:nvSpPr>
+            <p:cNvPr id="36" name="矩形 35">
+              <a:extLst>
+                <a:ext uri="{FF2B5EF4-FFF2-40B4-BE49-F238E27FC236}">
+                  <a16:creationId xmlns:a16="http://schemas.microsoft.com/office/drawing/2014/main" id="{A9C7FFAF-5678-4F68-8420-3B88D078D673}"/>
+                </a:ext>
+              </a:extLst>
+            </p:cNvPr>
+            <p:cNvSpPr/>
+            <p:nvPr/>
+          </p:nvSpPr>
+          <p:spPr>
+            <a:xfrm>
+              <a:off x="5984872" y="2742405"/>
+              <a:ext cx="102393" cy="130967"/>
+            </a:xfrm>
+            <a:prstGeom prst="rect">
+              <a:avLst/>
+            </a:prstGeom>
+            <a:solidFill>
+              <a:schemeClr val="bg1"/>
+            </a:solidFill>
+            <a:ln>
+              <a:noFill/>
+            </a:ln>
+          </p:spPr>
+          <p:style>
+            <a:lnRef idx="2">
+              <a:schemeClr val="accent1">
+                <a:shade val="50000"/>
+              </a:schemeClr>
+            </a:lnRef>
+            <a:fillRef idx="1">
+              <a:schemeClr val="accent1"/>
+            </a:fillRef>
+            <a:effectRef idx="0">
+              <a:schemeClr val="accent1"/>
+            </a:effectRef>
+            <a:fontRef idx="minor">
+              <a:schemeClr val="lt1"/>
+            </a:fontRef>
+          </p:style>
+          <p:txBody>
+            <a:bodyPr rtlCol="0" anchor="ctr"/>
+            <a:lstStyle/>
+            <a:p>
+              <a:pPr algn="ctr"/>
+              <a:r>
+                <a:rPr lang="zh-CN" altLang="en-US" sz="800" dirty="0">
+                  <a:solidFill>
+                    <a:schemeClr val="tx1"/>
+                  </a:solidFill>
+                </a:rPr>
+                <a:t>否</a:t>
+              </a:r>
+            </a:p>
+          </p:txBody>
+        </p:sp>
+        <p:sp>
+          <p:nvSpPr>
+            <p:cNvPr id="39" name="矩形 38">
+              <a:extLst>
+                <a:ext uri="{FF2B5EF4-FFF2-40B4-BE49-F238E27FC236}">
+                  <a16:creationId xmlns:a16="http://schemas.microsoft.com/office/drawing/2014/main" id="{93842B3A-9AFD-4CAD-92DE-7F8DCF40B7CE}"/>
+                </a:ext>
+              </a:extLst>
+            </p:cNvPr>
+            <p:cNvSpPr/>
+            <p:nvPr/>
+          </p:nvSpPr>
+          <p:spPr>
+            <a:xfrm>
+              <a:off x="8310559" y="1514872"/>
+              <a:ext cx="102393" cy="130967"/>
+            </a:xfrm>
+            <a:prstGeom prst="rect">
+              <a:avLst/>
+            </a:prstGeom>
+            <a:solidFill>
+              <a:schemeClr val="bg1"/>
+            </a:solidFill>
+            <a:ln>
+              <a:noFill/>
+            </a:ln>
+          </p:spPr>
+          <p:style>
+            <a:lnRef idx="2">
+              <a:schemeClr val="accent1">
+                <a:shade val="50000"/>
+              </a:schemeClr>
+            </a:lnRef>
+            <a:fillRef idx="1">
+              <a:schemeClr val="accent1"/>
+            </a:fillRef>
+            <a:effectRef idx="0">
+              <a:schemeClr val="accent1"/>
+            </a:effectRef>
+            <a:fontRef idx="minor">
+              <a:schemeClr val="lt1"/>
+            </a:fontRef>
+          </p:style>
+          <p:txBody>
+            <a:bodyPr rtlCol="0" anchor="ctr"/>
+            <a:lstStyle/>
+            <a:p>
+              <a:pPr algn="ctr"/>
+              <a:r>
+                <a:rPr lang="zh-CN" altLang="en-US" sz="800" dirty="0">
+                  <a:solidFill>
+                    <a:schemeClr val="tx1"/>
+                  </a:solidFill>
+                </a:rPr>
+                <a:t>否</a:t>
+              </a:r>
+            </a:p>
+          </p:txBody>
+        </p:sp>
+        <p:sp>
+          <p:nvSpPr>
+            <p:cNvPr id="40" name="矩形 39">
+              <a:extLst>
+                <a:ext uri="{FF2B5EF4-FFF2-40B4-BE49-F238E27FC236}">
+                  <a16:creationId xmlns:a16="http://schemas.microsoft.com/office/drawing/2014/main" id="{4312BA02-DB43-4C6D-8355-51F1A32D707E}"/>
+                </a:ext>
+              </a:extLst>
+            </p:cNvPr>
+            <p:cNvSpPr/>
+            <p:nvPr/>
+          </p:nvSpPr>
+          <p:spPr>
+            <a:xfrm>
+              <a:off x="9846924" y="5410606"/>
+              <a:ext cx="583409" cy="130967"/>
+            </a:xfrm>
+            <a:prstGeom prst="rect">
+              <a:avLst/>
+            </a:prstGeom>
+            <a:solidFill>
+              <a:schemeClr val="bg1"/>
+            </a:solidFill>
+            <a:ln>
+              <a:noFill/>
+            </a:ln>
+          </p:spPr>
+          <p:style>
+            <a:lnRef idx="2">
+              <a:schemeClr val="accent1">
+                <a:shade val="50000"/>
+              </a:schemeClr>
+            </a:lnRef>
+            <a:fillRef idx="1">
+              <a:schemeClr val="accent1"/>
+            </a:fillRef>
+            <a:effectRef idx="0">
+              <a:schemeClr val="accent1"/>
+            </a:effectRef>
+            <a:fontRef idx="minor">
+              <a:schemeClr val="lt1"/>
+            </a:fontRef>
+          </p:style>
+          <p:txBody>
+            <a:bodyPr rtlCol="0" anchor="ctr"/>
+            <a:lstStyle/>
+            <a:p>
+              <a:pPr algn="ctr"/>
+              <a:r>
+                <a:rPr lang="zh-CN" altLang="en-US" sz="800" dirty="0">
+                  <a:solidFill>
+                    <a:schemeClr val="tx1"/>
+                  </a:solidFill>
+                </a:rPr>
+                <a:t>否，为</a:t>
+              </a:r>
+              <a:r>
+                <a:rPr lang="en-US" altLang="zh-CN" sz="800" dirty="0">
+                  <a:solidFill>
+                    <a:schemeClr val="tx1"/>
+                  </a:solidFill>
+                </a:rPr>
+                <a:t>S</a:t>
+              </a:r>
+              <a:endParaRPr lang="zh-CN" altLang="en-US" sz="800" dirty="0">
+                <a:solidFill>
+                  <a:schemeClr val="tx1"/>
+                </a:solidFill>
+              </a:endParaRPr>
+            </a:p>
+          </p:txBody>
+        </p:sp>
+      </p:grpSp>
+    </p:spTree>
+    <p:extLst>
+      <p:ext uri="{BB962C8B-B14F-4D97-AF65-F5344CB8AC3E}">
+        <p14:creationId xmlns:p14="http://schemas.microsoft.com/office/powerpoint/2010/main" val="568831833"/>
+      </p:ext>
+    </p:extLst>
+  </p:cSld>
+  <p:clrMapOvr>
+    <a:masterClrMapping/>
+  </p:clrMapOvr>
+</p:sld>
+</file>
+
 <file path=ppt/theme/theme1.xml><?xml version="1.0" encoding="utf-8"?>
 <a:theme xmlns:a="http://schemas.openxmlformats.org/drawingml/2006/main" name="Office 主题​​">
   <a:themeElements>

</xml_diff>